<commit_message>
add task 3 slides
</commit_message>
<xml_diff>
--- a/docs/D214 PA Task 3 Presentation (Rev. 0).pptx
+++ b/docs/D214 PA Task 3 Presentation (Rev. 0).pptx
@@ -150,9 +150,33 @@
 <file path=ppt/changesInfos/changesInfo1.xml><?xml version="1.0" encoding="utf-8"?>
 <pc:chgInfo xmlns:a="http://schemas.openxmlformats.org/drawingml/2006/main" xmlns:r="http://schemas.openxmlformats.org/officeDocument/2006/relationships" xmlns:ac="http://schemas.microsoft.com/office/drawing/2013/main/command" xmlns:pc="http://schemas.microsoft.com/office/powerpoint/2013/main/command">
   <pc:docChgLst>
+    <pc:chgData name="Ednalyn C. De Dios" userId="88435278c928d21f" providerId="LiveId" clId="{DE42536A-7206-4640-9ED8-FC8921841999}"/>
+    <pc:docChg chg="modSld">
+      <pc:chgData name="Ednalyn C. De Dios" userId="88435278c928d21f" providerId="LiveId" clId="{DE42536A-7206-4640-9ED8-FC8921841999}" dt="2023-09-17T03:24:14.658" v="1" actId="20577"/>
+      <pc:docMkLst>
+        <pc:docMk/>
+      </pc:docMkLst>
+      <pc:sldChg chg="modSp mod">
+        <pc:chgData name="Ednalyn C. De Dios" userId="88435278c928d21f" providerId="LiveId" clId="{DE42536A-7206-4640-9ED8-FC8921841999}" dt="2023-09-17T03:24:14.658" v="1" actId="20577"/>
+        <pc:sldMkLst>
+          <pc:docMk/>
+          <pc:sldMk cId="4097075623" sldId="256"/>
+        </pc:sldMkLst>
+        <pc:spChg chg="mod">
+          <ac:chgData name="Ednalyn C. De Dios" userId="88435278c928d21f" providerId="LiveId" clId="{DE42536A-7206-4640-9ED8-FC8921841999}" dt="2023-09-17T03:24:14.658" v="1" actId="20577"/>
+          <ac:spMkLst>
+            <pc:docMk/>
+            <pc:sldMk cId="4097075623" sldId="256"/>
+            <ac:spMk id="3" creationId="{48A29145-1BEB-ACE4-B3A5-3D030242598C}"/>
+          </ac:spMkLst>
+        </pc:spChg>
+      </pc:sldChg>
+    </pc:docChg>
+  </pc:docChgLst>
+  <pc:docChgLst>
     <pc:chgData name="Ednalyn De Dios" userId="88435278c928d21f" providerId="LiveId" clId="{DE42536A-7206-4640-9ED8-FC8921841999}"/>
     <pc:docChg chg="undo custSel addSld delSld modSld sldOrd">
-      <pc:chgData name="Ednalyn De Dios" userId="88435278c928d21f" providerId="LiveId" clId="{DE42536A-7206-4640-9ED8-FC8921841999}" dt="2023-09-16T15:24:56.331" v="5919" actId="20577"/>
+      <pc:chgData name="Ednalyn De Dios" userId="88435278c928d21f" providerId="LiveId" clId="{DE42536A-7206-4640-9ED8-FC8921841999}" dt="2023-09-16T16:07:52.924" v="9715" actId="20577"/>
       <pc:docMkLst>
         <pc:docMk/>
       </pc:docMkLst>
@@ -534,7 +558,7 @@
         </pc:picChg>
       </pc:sldChg>
       <pc:sldChg chg="addSp new mod modNotesTx">
-        <pc:chgData name="Ednalyn De Dios" userId="88435278c928d21f" providerId="LiveId" clId="{DE42536A-7206-4640-9ED8-FC8921841999}" dt="2023-09-16T15:24:56.331" v="5919" actId="20577"/>
+        <pc:chgData name="Ednalyn De Dios" userId="88435278c928d21f" providerId="LiveId" clId="{DE42536A-7206-4640-9ED8-FC8921841999}" dt="2023-09-16T15:43:53.334" v="6081" actId="20577"/>
         <pc:sldMkLst>
           <pc:docMk/>
           <pc:sldMk cId="1484669980" sldId="273"/>
@@ -563,8 +587,8 @@
           </ac:spMkLst>
         </pc:spChg>
       </pc:sldChg>
-      <pc:sldChg chg="addSp new mod">
-        <pc:chgData name="Ednalyn De Dios" userId="88435278c928d21f" providerId="LiveId" clId="{DE42536A-7206-4640-9ED8-FC8921841999}" dt="2023-09-16T05:21:22.848" v="275" actId="22"/>
+      <pc:sldChg chg="addSp new mod modNotesTx">
+        <pc:chgData name="Ednalyn De Dios" userId="88435278c928d21f" providerId="LiveId" clId="{DE42536A-7206-4640-9ED8-FC8921841999}" dt="2023-09-16T15:46:03.975" v="6500" actId="20577"/>
         <pc:sldMkLst>
           <pc:docMk/>
           <pc:sldMk cId="3756251702" sldId="275"/>
@@ -578,8 +602,8 @@
           </ac:picMkLst>
         </pc:picChg>
       </pc:sldChg>
-      <pc:sldChg chg="addSp delSp modSp add mod ord setBg setClrOvrMap">
-        <pc:chgData name="Ednalyn De Dios" userId="88435278c928d21f" providerId="LiveId" clId="{DE42536A-7206-4640-9ED8-FC8921841999}" dt="2023-09-16T05:27:25.640" v="399" actId="20577"/>
+      <pc:sldChg chg="addSp delSp modSp add mod ord setBg setClrOvrMap modNotesTx">
+        <pc:chgData name="Ednalyn De Dios" userId="88435278c928d21f" providerId="LiveId" clId="{DE42536A-7206-4640-9ED8-FC8921841999}" dt="2023-09-16T15:51:32.042" v="7141" actId="20577"/>
         <pc:sldMkLst>
           <pc:docMk/>
           <pc:sldMk cId="2705927362" sldId="276"/>
@@ -681,8 +705,8 @@
           </ac:cxnSpMkLst>
         </pc:cxnChg>
       </pc:sldChg>
-      <pc:sldChg chg="addSp delSp modSp add mod ord setBg">
-        <pc:chgData name="Ednalyn De Dios" userId="88435278c928d21f" providerId="LiveId" clId="{DE42536A-7206-4640-9ED8-FC8921841999}" dt="2023-09-16T05:29:45.602" v="616" actId="26606"/>
+      <pc:sldChg chg="addSp delSp modSp add mod ord setBg modNotesTx">
+        <pc:chgData name="Ednalyn De Dios" userId="88435278c928d21f" providerId="LiveId" clId="{DE42536A-7206-4640-9ED8-FC8921841999}" dt="2023-09-16T16:02:31.805" v="8863" actId="20577"/>
         <pc:sldMkLst>
           <pc:docMk/>
           <pc:sldMk cId="4157680673" sldId="277"/>
@@ -720,8 +744,8 @@
           </ac:picMkLst>
         </pc:picChg>
       </pc:sldChg>
-      <pc:sldChg chg="addSp delSp modSp add mod setBg setClrOvrMap">
-        <pc:chgData name="Ednalyn De Dios" userId="88435278c928d21f" providerId="LiveId" clId="{DE42536A-7206-4640-9ED8-FC8921841999}" dt="2023-09-16T05:33:31.872" v="832" actId="5793"/>
+      <pc:sldChg chg="addSp delSp modSp add mod setBg setClrOvrMap modNotesTx">
+        <pc:chgData name="Ednalyn De Dios" userId="88435278c928d21f" providerId="LiveId" clId="{DE42536A-7206-4640-9ED8-FC8921841999}" dt="2023-09-16T16:07:52.924" v="9715" actId="20577"/>
         <pc:sldMkLst>
           <pc:docMk/>
           <pc:sldMk cId="132013370" sldId="278"/>
@@ -911,8 +935,8 @@
           </ac:cxnSpMkLst>
         </pc:cxnChg>
       </pc:sldChg>
-      <pc:sldChg chg="addSp delSp modSp new mod setBg">
-        <pc:chgData name="Ednalyn De Dios" userId="88435278c928d21f" providerId="LiveId" clId="{DE42536A-7206-4640-9ED8-FC8921841999}" dt="2023-09-16T05:23:30.504" v="290" actId="1076"/>
+      <pc:sldChg chg="addSp delSp modSp new mod ord setBg modNotesTx">
+        <pc:chgData name="Ednalyn De Dios" userId="88435278c928d21f" providerId="LiveId" clId="{DE42536A-7206-4640-9ED8-FC8921841999}" dt="2023-09-16T15:51:40.079" v="7143"/>
         <pc:sldMkLst>
           <pc:docMk/>
           <pc:sldMk cId="661792966" sldId="279"/>
@@ -950,8 +974,8 @@
           </ac:grpSpMkLst>
         </pc:grpChg>
       </pc:sldChg>
-      <pc:sldChg chg="addSp delSp modSp add mod">
-        <pc:chgData name="Ednalyn De Dios" userId="88435278c928d21f" providerId="LiveId" clId="{DE42536A-7206-4640-9ED8-FC8921841999}" dt="2023-09-16T05:24:17.643" v="309" actId="26606"/>
+      <pc:sldChg chg="addSp delSp modSp add mod modNotesTx">
+        <pc:chgData name="Ednalyn De Dios" userId="88435278c928d21f" providerId="LiveId" clId="{DE42536A-7206-4640-9ED8-FC8921841999}" dt="2023-09-16T15:52:25.801" v="7255" actId="20577"/>
         <pc:sldMkLst>
           <pc:docMk/>
           <pc:sldMk cId="4123707811" sldId="280"/>
@@ -1013,8 +1037,8 @@
           </ac:picMkLst>
         </pc:picChg>
       </pc:sldChg>
-      <pc:sldChg chg="addSp delSp modSp add mod">
-        <pc:chgData name="Ednalyn De Dios" userId="88435278c928d21f" providerId="LiveId" clId="{DE42536A-7206-4640-9ED8-FC8921841999}" dt="2023-09-16T05:24:36.311" v="318" actId="26606"/>
+      <pc:sldChg chg="addSp delSp modSp add mod modNotesTx">
+        <pc:chgData name="Ednalyn De Dios" userId="88435278c928d21f" providerId="LiveId" clId="{DE42536A-7206-4640-9ED8-FC8921841999}" dt="2023-09-16T16:03:08.666" v="8965" actId="20577"/>
         <pc:sldMkLst>
           <pc:docMk/>
           <pc:sldMk cId="507219090" sldId="281"/>
@@ -2154,7 +2178,7 @@
   <dgm:whole/>
   <dgm:extLst>
     <a:ext uri="http://schemas.microsoft.com/office/drawing/2008/diagram">
-      <dsp:dataModelExt xmlns:dsp="http://schemas.microsoft.com/office/drawing/2008/diagram" relId="rId7" minVer="http://schemas.openxmlformats.org/drawingml/2006/diagram"/>
+      <dsp:dataModelExt xmlns:dsp="http://schemas.microsoft.com/office/drawing/2008/diagram" relId="rId8" minVer="http://schemas.openxmlformats.org/drawingml/2006/diagram"/>
     </a:ext>
   </dgm:extLst>
 </dgm:dataModel>
@@ -5130,7 +5154,7 @@
           <a:p>
             <a:r>
               <a:rPr lang="en-US" dirty="0"/>
-              <a:t>After all is said and done, the accuracy of the final model is 66% with an AUC score of 65%.</a:t>
+              <a:t>After all is said and done, the accuracy of the final model is 66% with an AUC score of 65%. This validates our alternate hypothesis that a gradient boosting model can be built using the Online News Popularity dataset.</a:t>
             </a:r>
           </a:p>
         </p:txBody>
@@ -5162,6 +5186,180 @@
     <p:extLst>
       <p:ext uri="{BB962C8B-B14F-4D97-AF65-F5344CB8AC3E}">
         <p14:creationId xmlns:p14="http://schemas.microsoft.com/office/powerpoint/2010/main" val="2311148259"/>
+      </p:ext>
+    </p:extLst>
+  </p:cSld>
+  <p:clrMapOvr>
+    <a:masterClrMapping/>
+  </p:clrMapOvr>
+</p:notes>
+</file>
+
+<file path=ppt/notesSlides/notesSlide18.xml><?xml version="1.0" encoding="utf-8"?>
+<p:notes xmlns:a="http://schemas.openxmlformats.org/drawingml/2006/main" xmlns:r="http://schemas.openxmlformats.org/officeDocument/2006/relationships" xmlns:p="http://schemas.openxmlformats.org/presentationml/2006/main">
+  <p:cSld>
+    <p:spTree>
+      <p:nvGrpSpPr>
+        <p:cNvPr id="1" name=""/>
+        <p:cNvGrpSpPr/>
+        <p:nvPr/>
+      </p:nvGrpSpPr>
+      <p:grpSpPr>
+        <a:xfrm>
+          <a:off x="0" y="0"/>
+          <a:ext cx="0" cy="0"/>
+          <a:chOff x="0" y="0"/>
+          <a:chExt cx="0" cy="0"/>
+        </a:xfrm>
+      </p:grpSpPr>
+      <p:sp>
+        <p:nvSpPr>
+          <p:cNvPr id="2" name="Slide Image Placeholder 1"/>
+          <p:cNvSpPr>
+            <a:spLocks noGrp="1" noRot="1" noChangeAspect="1"/>
+          </p:cNvSpPr>
+          <p:nvPr>
+            <p:ph type="sldImg"/>
+          </p:nvPr>
+        </p:nvSpPr>
+        <p:spPr/>
+      </p:sp>
+      <p:sp>
+        <p:nvSpPr>
+          <p:cNvPr id="3" name="Notes Placeholder 2"/>
+          <p:cNvSpPr>
+            <a:spLocks noGrp="1"/>
+          </p:cNvSpPr>
+          <p:nvPr>
+            <p:ph type="body" idx="1"/>
+          </p:nvPr>
+        </p:nvSpPr>
+        <p:spPr/>
+        <p:txBody>
+          <a:bodyPr/>
+          <a:lstStyle/>
+          <a:p>
+            <a:r>
+              <a:rPr lang="en-US" dirty="0"/>
+              <a:t>After constructing the final model, I proceeded to take the mean SHAP values of the variables and sort them in order of importance. In other words, I extracted the top variables that are most important because they are the factors the heavily influence whether an online news article form Mashable is going to go viral or not.</a:t>
+            </a:r>
+          </a:p>
+        </p:txBody>
+      </p:sp>
+      <p:sp>
+        <p:nvSpPr>
+          <p:cNvPr id="4" name="Slide Number Placeholder 3"/>
+          <p:cNvSpPr>
+            <a:spLocks noGrp="1"/>
+          </p:cNvSpPr>
+          <p:nvPr>
+            <p:ph type="sldNum" sz="quarter" idx="5"/>
+          </p:nvPr>
+        </p:nvSpPr>
+        <p:spPr/>
+        <p:txBody>
+          <a:bodyPr/>
+          <a:lstStyle/>
+          <a:p>
+            <a:fld id="{AE1118B8-C534-4ADF-A307-3245EFD82A5F}" type="slidenum">
+              <a:rPr lang="en-US" smtClean="0"/>
+              <a:t>18</a:t>
+            </a:fld>
+            <a:endParaRPr lang="en-US"/>
+          </a:p>
+        </p:txBody>
+      </p:sp>
+    </p:spTree>
+    <p:extLst>
+      <p:ext uri="{BB962C8B-B14F-4D97-AF65-F5344CB8AC3E}">
+        <p14:creationId xmlns:p14="http://schemas.microsoft.com/office/powerpoint/2010/main" val="402421599"/>
+      </p:ext>
+    </p:extLst>
+  </p:cSld>
+  <p:clrMapOvr>
+    <a:masterClrMapping/>
+  </p:clrMapOvr>
+</p:notes>
+</file>
+
+<file path=ppt/notesSlides/notesSlide19.xml><?xml version="1.0" encoding="utf-8"?>
+<p:notes xmlns:a="http://schemas.openxmlformats.org/drawingml/2006/main" xmlns:r="http://schemas.openxmlformats.org/officeDocument/2006/relationships" xmlns:p="http://schemas.openxmlformats.org/presentationml/2006/main">
+  <p:cSld>
+    <p:spTree>
+      <p:nvGrpSpPr>
+        <p:cNvPr id="1" name=""/>
+        <p:cNvGrpSpPr/>
+        <p:nvPr/>
+      </p:nvGrpSpPr>
+      <p:grpSpPr>
+        <a:xfrm>
+          <a:off x="0" y="0"/>
+          <a:ext cx="0" cy="0"/>
+          <a:chOff x="0" y="0"/>
+          <a:chExt cx="0" cy="0"/>
+        </a:xfrm>
+      </p:grpSpPr>
+      <p:sp>
+        <p:nvSpPr>
+          <p:cNvPr id="2" name="Slide Image Placeholder 1"/>
+          <p:cNvSpPr>
+            <a:spLocks noGrp="1" noRot="1" noChangeAspect="1"/>
+          </p:cNvSpPr>
+          <p:nvPr>
+            <p:ph type="sldImg"/>
+          </p:nvPr>
+        </p:nvSpPr>
+        <p:spPr/>
+      </p:sp>
+      <p:sp>
+        <p:nvSpPr>
+          <p:cNvPr id="3" name="Notes Placeholder 2"/>
+          <p:cNvSpPr>
+            <a:spLocks noGrp="1"/>
+          </p:cNvSpPr>
+          <p:nvPr>
+            <p:ph type="body" idx="1"/>
+          </p:nvPr>
+        </p:nvSpPr>
+        <p:spPr/>
+        <p:txBody>
+          <a:bodyPr/>
+          <a:lstStyle/>
+          <a:p>
+            <a:r>
+              <a:rPr lang="en-US" dirty="0"/>
+              <a:t>There is one glaring limitation of this study.</a:t>
+            </a:r>
+          </a:p>
+        </p:txBody>
+      </p:sp>
+      <p:sp>
+        <p:nvSpPr>
+          <p:cNvPr id="4" name="Slide Number Placeholder 3"/>
+          <p:cNvSpPr>
+            <a:spLocks noGrp="1"/>
+          </p:cNvSpPr>
+          <p:nvPr>
+            <p:ph type="sldNum" sz="quarter" idx="5"/>
+          </p:nvPr>
+        </p:nvSpPr>
+        <p:spPr/>
+        <p:txBody>
+          <a:bodyPr/>
+          <a:lstStyle/>
+          <a:p>
+            <a:fld id="{AE1118B8-C534-4ADF-A307-3245EFD82A5F}" type="slidenum">
+              <a:rPr lang="en-US" smtClean="0"/>
+              <a:t>19</a:t>
+            </a:fld>
+            <a:endParaRPr lang="en-US"/>
+          </a:p>
+        </p:txBody>
+      </p:sp>
+    </p:spTree>
+    <p:extLst>
+      <p:ext uri="{BB962C8B-B14F-4D97-AF65-F5344CB8AC3E}">
+        <p14:creationId xmlns:p14="http://schemas.microsoft.com/office/powerpoint/2010/main" val="2104615556"/>
       </p:ext>
     </p:extLst>
   </p:cSld>
@@ -5258,6 +5456,488 @@
     <p:extLst>
       <p:ext uri="{BB962C8B-B14F-4D97-AF65-F5344CB8AC3E}">
         <p14:creationId xmlns:p14="http://schemas.microsoft.com/office/powerpoint/2010/main" val="2544082997"/>
+      </p:ext>
+    </p:extLst>
+  </p:cSld>
+  <p:clrMapOvr>
+    <a:masterClrMapping/>
+  </p:clrMapOvr>
+</p:notes>
+</file>
+
+<file path=ppt/notesSlides/notesSlide20.xml><?xml version="1.0" encoding="utf-8"?>
+<p:notes xmlns:a="http://schemas.openxmlformats.org/drawingml/2006/main" xmlns:r="http://schemas.openxmlformats.org/officeDocument/2006/relationships" xmlns:p="http://schemas.openxmlformats.org/presentationml/2006/main">
+  <p:cSld>
+    <p:spTree>
+      <p:nvGrpSpPr>
+        <p:cNvPr id="1" name=""/>
+        <p:cNvGrpSpPr/>
+        <p:nvPr/>
+      </p:nvGrpSpPr>
+      <p:grpSpPr>
+        <a:xfrm>
+          <a:off x="0" y="0"/>
+          <a:ext cx="0" cy="0"/>
+          <a:chOff x="0" y="0"/>
+          <a:chExt cx="0" cy="0"/>
+        </a:xfrm>
+      </p:grpSpPr>
+      <p:sp>
+        <p:nvSpPr>
+          <p:cNvPr id="2" name="Slide Image Placeholder 1"/>
+          <p:cNvSpPr>
+            <a:spLocks noGrp="1" noRot="1" noChangeAspect="1"/>
+          </p:cNvSpPr>
+          <p:nvPr>
+            <p:ph type="sldImg"/>
+          </p:nvPr>
+        </p:nvSpPr>
+        <p:spPr/>
+      </p:sp>
+      <p:sp>
+        <p:nvSpPr>
+          <p:cNvPr id="3" name="Notes Placeholder 2"/>
+          <p:cNvSpPr>
+            <a:spLocks noGrp="1"/>
+          </p:cNvSpPr>
+          <p:nvPr>
+            <p:ph type="body" idx="1"/>
+          </p:nvPr>
+        </p:nvSpPr>
+        <p:spPr/>
+        <p:txBody>
+          <a:bodyPr/>
+          <a:lstStyle/>
+          <a:p>
+            <a:r>
+              <a:rPr lang="en-US" dirty="0"/>
+              <a:t>The niched nature of the articles.</a:t>
+            </a:r>
+          </a:p>
+          <a:p>
+            <a:endParaRPr lang="en-US" dirty="0"/>
+          </a:p>
+          <a:p>
+            <a:r>
+              <a:rPr lang="en-US" dirty="0"/>
+              <a:t>Mashable’s customer base are mostly interested Tech, Business, and Entertainment. The fact that all the articles in the dataset are published in Mashable means that our findings would not necessarily apply to other publications that have a different kind of niche. In other words, what works well for Mashable would not necessarily translate into success for Washington Post.</a:t>
+            </a:r>
+          </a:p>
+        </p:txBody>
+      </p:sp>
+      <p:sp>
+        <p:nvSpPr>
+          <p:cNvPr id="4" name="Slide Number Placeholder 3"/>
+          <p:cNvSpPr>
+            <a:spLocks noGrp="1"/>
+          </p:cNvSpPr>
+          <p:nvPr>
+            <p:ph type="sldNum" sz="quarter" idx="5"/>
+          </p:nvPr>
+        </p:nvSpPr>
+        <p:spPr/>
+        <p:txBody>
+          <a:bodyPr/>
+          <a:lstStyle/>
+          <a:p>
+            <a:fld id="{AE1118B8-C534-4ADF-A307-3245EFD82A5F}" type="slidenum">
+              <a:rPr lang="en-US" smtClean="0"/>
+              <a:t>20</a:t>
+            </a:fld>
+            <a:endParaRPr lang="en-US"/>
+          </a:p>
+        </p:txBody>
+      </p:sp>
+    </p:spTree>
+    <p:extLst>
+      <p:ext uri="{BB962C8B-B14F-4D97-AF65-F5344CB8AC3E}">
+        <p14:creationId xmlns:p14="http://schemas.microsoft.com/office/powerpoint/2010/main" val="1179117486"/>
+      </p:ext>
+    </p:extLst>
+  </p:cSld>
+  <p:clrMapOvr>
+    <a:masterClrMapping/>
+  </p:clrMapOvr>
+</p:notes>
+</file>
+
+<file path=ppt/notesSlides/notesSlide21.xml><?xml version="1.0" encoding="utf-8"?>
+<p:notes xmlns:a="http://schemas.openxmlformats.org/drawingml/2006/main" xmlns:r="http://schemas.openxmlformats.org/officeDocument/2006/relationships" xmlns:p="http://schemas.openxmlformats.org/presentationml/2006/main">
+  <p:cSld>
+    <p:spTree>
+      <p:nvGrpSpPr>
+        <p:cNvPr id="1" name=""/>
+        <p:cNvGrpSpPr/>
+        <p:nvPr/>
+      </p:nvGrpSpPr>
+      <p:grpSpPr>
+        <a:xfrm>
+          <a:off x="0" y="0"/>
+          <a:ext cx="0" cy="0"/>
+          <a:chOff x="0" y="0"/>
+          <a:chExt cx="0" cy="0"/>
+        </a:xfrm>
+      </p:grpSpPr>
+      <p:sp>
+        <p:nvSpPr>
+          <p:cNvPr id="2" name="Slide Image Placeholder 1"/>
+          <p:cNvSpPr>
+            <a:spLocks noGrp="1" noRot="1" noChangeAspect="1"/>
+          </p:cNvSpPr>
+          <p:nvPr>
+            <p:ph type="sldImg"/>
+          </p:nvPr>
+        </p:nvSpPr>
+        <p:spPr/>
+      </p:sp>
+      <p:sp>
+        <p:nvSpPr>
+          <p:cNvPr id="3" name="Notes Placeholder 2"/>
+          <p:cNvSpPr>
+            <a:spLocks noGrp="1"/>
+          </p:cNvSpPr>
+          <p:nvPr>
+            <p:ph type="body" idx="1"/>
+          </p:nvPr>
+        </p:nvSpPr>
+        <p:spPr/>
+        <p:txBody>
+          <a:bodyPr/>
+          <a:lstStyle/>
+          <a:p>
+            <a:r>
+              <a:rPr lang="en-US" dirty="0"/>
+              <a:t>Nevertheless, here are a few of my recommendations for future study.</a:t>
+            </a:r>
+          </a:p>
+        </p:txBody>
+      </p:sp>
+      <p:sp>
+        <p:nvSpPr>
+          <p:cNvPr id="4" name="Slide Number Placeholder 3"/>
+          <p:cNvSpPr>
+            <a:spLocks noGrp="1"/>
+          </p:cNvSpPr>
+          <p:nvPr>
+            <p:ph type="sldNum" sz="quarter" idx="5"/>
+          </p:nvPr>
+        </p:nvSpPr>
+        <p:spPr/>
+        <p:txBody>
+          <a:bodyPr/>
+          <a:lstStyle/>
+          <a:p>
+            <a:fld id="{AE1118B8-C534-4ADF-A307-3245EFD82A5F}" type="slidenum">
+              <a:rPr lang="en-US" smtClean="0"/>
+              <a:t>21</a:t>
+            </a:fld>
+            <a:endParaRPr lang="en-US"/>
+          </a:p>
+        </p:txBody>
+      </p:sp>
+    </p:spTree>
+    <p:extLst>
+      <p:ext uri="{BB962C8B-B14F-4D97-AF65-F5344CB8AC3E}">
+        <p14:creationId xmlns:p14="http://schemas.microsoft.com/office/powerpoint/2010/main" val="3044844845"/>
+      </p:ext>
+    </p:extLst>
+  </p:cSld>
+  <p:clrMapOvr>
+    <a:masterClrMapping/>
+  </p:clrMapOvr>
+</p:notes>
+</file>
+
+<file path=ppt/notesSlides/notesSlide22.xml><?xml version="1.0" encoding="utf-8"?>
+<p:notes xmlns:a="http://schemas.openxmlformats.org/drawingml/2006/main" xmlns:r="http://schemas.openxmlformats.org/officeDocument/2006/relationships" xmlns:p="http://schemas.openxmlformats.org/presentationml/2006/main">
+  <p:cSld>
+    <p:spTree>
+      <p:nvGrpSpPr>
+        <p:cNvPr id="1" name=""/>
+        <p:cNvGrpSpPr/>
+        <p:nvPr/>
+      </p:nvGrpSpPr>
+      <p:grpSpPr>
+        <a:xfrm>
+          <a:off x="0" y="0"/>
+          <a:ext cx="0" cy="0"/>
+          <a:chOff x="0" y="0"/>
+          <a:chExt cx="0" cy="0"/>
+        </a:xfrm>
+      </p:grpSpPr>
+      <p:sp>
+        <p:nvSpPr>
+          <p:cNvPr id="2" name="Slide Image Placeholder 1"/>
+          <p:cNvSpPr>
+            <a:spLocks noGrp="1" noRot="1" noChangeAspect="1"/>
+          </p:cNvSpPr>
+          <p:nvPr>
+            <p:ph type="sldImg"/>
+          </p:nvPr>
+        </p:nvSpPr>
+        <p:spPr/>
+      </p:sp>
+      <p:sp>
+        <p:nvSpPr>
+          <p:cNvPr id="3" name="Notes Placeholder 2"/>
+          <p:cNvSpPr>
+            <a:spLocks noGrp="1"/>
+          </p:cNvSpPr>
+          <p:nvPr>
+            <p:ph type="body" idx="1"/>
+          </p:nvPr>
+        </p:nvSpPr>
+        <p:spPr/>
+        <p:txBody>
+          <a:bodyPr/>
+          <a:lstStyle/>
+          <a:p>
+            <a:pPr marL="171450" indent="-171450">
+              <a:buFont typeface="Arial" panose="020B0604020202020204" pitchFamily="34" charset="0"/>
+              <a:buChar char="•"/>
+            </a:pPr>
+            <a:r>
+              <a:rPr lang="en-US" dirty="0"/>
+              <a:t>First, discern what type of articles to publish on the weekend because weekend articles are more likely to go viral. If the publication has an article that they want to go viral but are not sure, they can choose to publish that article on the weekend because the guarantee that it will go viral is greater than if it were to be published during the week. Publishing during the week carries the chance of that article getting overlooked among all the noise in the news cycle.</a:t>
+            </a:r>
+          </a:p>
+          <a:p>
+            <a:pPr marL="171450" indent="-171450">
+              <a:buFont typeface="Arial" panose="020B0604020202020204" pitchFamily="34" charset="0"/>
+              <a:buChar char="•"/>
+            </a:pPr>
+            <a:r>
+              <a:rPr lang="en-US" dirty="0"/>
+              <a:t>Second, use XGBoost regression instead of a classifier. This study had set a threshold of 1400 shares and created a variable out of it. If an article has more than 1400 shares on social media, it is considered viral. If not, it is labeled as not viral. This process presents the possibility of information loss. Instead of predicting the label of viral or not, we can instead use the number of shares itself and predict it.</a:t>
+            </a:r>
+          </a:p>
+          <a:p>
+            <a:pPr marL="171450" indent="-171450">
+              <a:buFont typeface="Arial" panose="020B0604020202020204" pitchFamily="34" charset="0"/>
+              <a:buChar char="•"/>
+            </a:pPr>
+            <a:r>
+              <a:rPr lang="en-US" dirty="0"/>
+              <a:t>Third, is clustering. We can use a clustering algorithm to group or segment the articles according to a set of characteristics. Doing this can unveil some hidden patterns within the data.</a:t>
+            </a:r>
+          </a:p>
+        </p:txBody>
+      </p:sp>
+      <p:sp>
+        <p:nvSpPr>
+          <p:cNvPr id="4" name="Slide Number Placeholder 3"/>
+          <p:cNvSpPr>
+            <a:spLocks noGrp="1"/>
+          </p:cNvSpPr>
+          <p:nvPr>
+            <p:ph type="sldNum" sz="quarter" idx="5"/>
+          </p:nvPr>
+        </p:nvSpPr>
+        <p:spPr/>
+        <p:txBody>
+          <a:bodyPr/>
+          <a:lstStyle/>
+          <a:p>
+            <a:fld id="{AE1118B8-C534-4ADF-A307-3245EFD82A5F}" type="slidenum">
+              <a:rPr lang="en-US" smtClean="0"/>
+              <a:t>22</a:t>
+            </a:fld>
+            <a:endParaRPr lang="en-US"/>
+          </a:p>
+        </p:txBody>
+      </p:sp>
+    </p:spTree>
+    <p:extLst>
+      <p:ext uri="{BB962C8B-B14F-4D97-AF65-F5344CB8AC3E}">
+        <p14:creationId xmlns:p14="http://schemas.microsoft.com/office/powerpoint/2010/main" val="2158688835"/>
+      </p:ext>
+    </p:extLst>
+  </p:cSld>
+  <p:clrMapOvr>
+    <a:masterClrMapping/>
+  </p:clrMapOvr>
+</p:notes>
+</file>
+
+<file path=ppt/notesSlides/notesSlide23.xml><?xml version="1.0" encoding="utf-8"?>
+<p:notes xmlns:a="http://schemas.openxmlformats.org/drawingml/2006/main" xmlns:r="http://schemas.openxmlformats.org/officeDocument/2006/relationships" xmlns:p="http://schemas.openxmlformats.org/presentationml/2006/main">
+  <p:cSld>
+    <p:spTree>
+      <p:nvGrpSpPr>
+        <p:cNvPr id="1" name=""/>
+        <p:cNvGrpSpPr/>
+        <p:nvPr/>
+      </p:nvGrpSpPr>
+      <p:grpSpPr>
+        <a:xfrm>
+          <a:off x="0" y="0"/>
+          <a:ext cx="0" cy="0"/>
+          <a:chOff x="0" y="0"/>
+          <a:chExt cx="0" cy="0"/>
+        </a:xfrm>
+      </p:grpSpPr>
+      <p:sp>
+        <p:nvSpPr>
+          <p:cNvPr id="2" name="Slide Image Placeholder 1"/>
+          <p:cNvSpPr>
+            <a:spLocks noGrp="1" noRot="1" noChangeAspect="1"/>
+          </p:cNvSpPr>
+          <p:nvPr>
+            <p:ph type="sldImg"/>
+          </p:nvPr>
+        </p:nvSpPr>
+        <p:spPr/>
+      </p:sp>
+      <p:sp>
+        <p:nvSpPr>
+          <p:cNvPr id="3" name="Notes Placeholder 2"/>
+          <p:cNvSpPr>
+            <a:spLocks noGrp="1"/>
+          </p:cNvSpPr>
+          <p:nvPr>
+            <p:ph type="body" idx="1"/>
+          </p:nvPr>
+        </p:nvSpPr>
+        <p:spPr/>
+        <p:txBody>
+          <a:bodyPr/>
+          <a:lstStyle/>
+          <a:p>
+            <a:r>
+              <a:rPr lang="en-US" dirty="0"/>
+              <a:t>There are all of things that we could in future studies. The question is, what are benefits now?</a:t>
+            </a:r>
+          </a:p>
+        </p:txBody>
+      </p:sp>
+      <p:sp>
+        <p:nvSpPr>
+          <p:cNvPr id="4" name="Slide Number Placeholder 3"/>
+          <p:cNvSpPr>
+            <a:spLocks noGrp="1"/>
+          </p:cNvSpPr>
+          <p:nvPr>
+            <p:ph type="sldNum" sz="quarter" idx="5"/>
+          </p:nvPr>
+        </p:nvSpPr>
+        <p:spPr/>
+        <p:txBody>
+          <a:bodyPr/>
+          <a:lstStyle/>
+          <a:p>
+            <a:fld id="{AE1118B8-C534-4ADF-A307-3245EFD82A5F}" type="slidenum">
+              <a:rPr lang="en-US" smtClean="0"/>
+              <a:t>23</a:t>
+            </a:fld>
+            <a:endParaRPr lang="en-US"/>
+          </a:p>
+        </p:txBody>
+      </p:sp>
+    </p:spTree>
+    <p:extLst>
+      <p:ext uri="{BB962C8B-B14F-4D97-AF65-F5344CB8AC3E}">
+        <p14:creationId xmlns:p14="http://schemas.microsoft.com/office/powerpoint/2010/main" val="1069520002"/>
+      </p:ext>
+    </p:extLst>
+  </p:cSld>
+  <p:clrMapOvr>
+    <a:masterClrMapping/>
+  </p:clrMapOvr>
+</p:notes>
+</file>
+
+<file path=ppt/notesSlides/notesSlide24.xml><?xml version="1.0" encoding="utf-8"?>
+<p:notes xmlns:a="http://schemas.openxmlformats.org/drawingml/2006/main" xmlns:r="http://schemas.openxmlformats.org/officeDocument/2006/relationships" xmlns:p="http://schemas.openxmlformats.org/presentationml/2006/main">
+  <p:cSld>
+    <p:spTree>
+      <p:nvGrpSpPr>
+        <p:cNvPr id="1" name=""/>
+        <p:cNvGrpSpPr/>
+        <p:nvPr/>
+      </p:nvGrpSpPr>
+      <p:grpSpPr>
+        <a:xfrm>
+          <a:off x="0" y="0"/>
+          <a:ext cx="0" cy="0"/>
+          <a:chOff x="0" y="0"/>
+          <a:chExt cx="0" cy="0"/>
+        </a:xfrm>
+      </p:grpSpPr>
+      <p:sp>
+        <p:nvSpPr>
+          <p:cNvPr id="2" name="Slide Image Placeholder 1"/>
+          <p:cNvSpPr>
+            <a:spLocks noGrp="1" noRot="1" noChangeAspect="1"/>
+          </p:cNvSpPr>
+          <p:nvPr>
+            <p:ph type="sldImg"/>
+          </p:nvPr>
+        </p:nvSpPr>
+        <p:spPr/>
+      </p:sp>
+      <p:sp>
+        <p:nvSpPr>
+          <p:cNvPr id="3" name="Notes Placeholder 2"/>
+          <p:cNvSpPr>
+            <a:spLocks noGrp="1"/>
+          </p:cNvSpPr>
+          <p:nvPr>
+            <p:ph type="body" idx="1"/>
+          </p:nvPr>
+        </p:nvSpPr>
+        <p:spPr/>
+        <p:txBody>
+          <a:bodyPr/>
+          <a:lstStyle/>
+          <a:p>
+            <a:r>
+              <a:rPr lang="en-US" dirty="0"/>
+              <a:t>First and foremost, the publisher of the online news articles can take the top features and formulate the optimum combination of characteristics that they can use to optimize their articles for virality.</a:t>
+            </a:r>
+          </a:p>
+          <a:p>
+            <a:endParaRPr lang="en-US" dirty="0"/>
+          </a:p>
+          <a:p>
+            <a:r>
+              <a:rPr lang="en-US" dirty="0"/>
+              <a:t>Second, other researchers can use the same methodology and use their own dataset to predict the virality of their content. After which, they can then extract the top factors the top features or the factors that contribute to a content </a:t>
+            </a:r>
+            <a:r>
+              <a:rPr lang="en-US"/>
+              <a:t>going viral or not.</a:t>
+            </a:r>
+            <a:endParaRPr lang="en-US" dirty="0"/>
+          </a:p>
+        </p:txBody>
+      </p:sp>
+      <p:sp>
+        <p:nvSpPr>
+          <p:cNvPr id="4" name="Slide Number Placeholder 3"/>
+          <p:cNvSpPr>
+            <a:spLocks noGrp="1"/>
+          </p:cNvSpPr>
+          <p:nvPr>
+            <p:ph type="sldNum" sz="quarter" idx="5"/>
+          </p:nvPr>
+        </p:nvSpPr>
+        <p:spPr/>
+        <p:txBody>
+          <a:bodyPr/>
+          <a:lstStyle/>
+          <a:p>
+            <a:fld id="{AE1118B8-C534-4ADF-A307-3245EFD82A5F}" type="slidenum">
+              <a:rPr lang="en-US" smtClean="0"/>
+              <a:t>24</a:t>
+            </a:fld>
+            <a:endParaRPr lang="en-US"/>
+          </a:p>
+        </p:txBody>
+      </p:sp>
+    </p:spTree>
+    <p:extLst>
+      <p:ext uri="{BB962C8B-B14F-4D97-AF65-F5344CB8AC3E}">
+        <p14:creationId xmlns:p14="http://schemas.microsoft.com/office/powerpoint/2010/main" val="1201364824"/>
       </p:ext>
     </p:extLst>
   </p:cSld>
@@ -9492,12 +10172,20 @@
           <a:p>
             <a:pPr algn="l"/>
             <a:r>
+              <a:rPr lang="en-US" sz="2000">
+                <a:solidFill>
+                  <a:schemeClr val="bg1"/>
+                </a:solidFill>
+              </a:rPr>
+              <a:t>September 16, </a:t>
+            </a:r>
+            <a:r>
               <a:rPr lang="en-US" sz="2000" dirty="0">
                 <a:solidFill>
                   <a:schemeClr val="bg1"/>
                 </a:solidFill>
               </a:rPr>
-              <a:t>September 17, 2023</a:t>
+              <a:t>2023</a:t>
             </a:r>
           </a:p>
         </p:txBody>
@@ -12618,7 +13306,7 @@
           <p:nvPr/>
         </p:nvPicPr>
         <p:blipFill>
-          <a:blip r:embed="rId2"/>
+          <a:blip r:embed="rId3"/>
           <a:stretch>
             <a:fillRect/>
           </a:stretch>
@@ -23156,7 +23844,7 @@
                 </a:pathLst>
               </a:custGeom>
               <a:blipFill>
-                <a:blip r:embed="rId2">
+                <a:blip r:embed="rId3">
                   <a:alphaModFix amt="57000"/>
                 </a:blip>
                 <a:tile tx="0" ty="0" sx="100000" sy="100000" flip="none" algn="tl"/>
@@ -23617,7 +24305,7 @@
           <p:nvPr/>
         </p:nvPicPr>
         <p:blipFill rotWithShape="1">
-          <a:blip r:embed="rId2">
+          <a:blip r:embed="rId3">
             <a:alphaModFix amt="35000"/>
           </a:blip>
           <a:srcRect t="1310" b="14420"/>
@@ -23844,7 +24532,7 @@
           <p:nvPr/>
         </p:nvPicPr>
         <p:blipFill rotWithShape="1">
-          <a:blip r:embed="rId2"/>
+          <a:blip r:embed="rId3"/>
           <a:srcRect t="7287" b="17713"/>
           <a:stretch/>
         </p:blipFill>
@@ -24100,7 +24788,7 @@
           <p:nvPr/>
         </p:nvPicPr>
         <p:blipFill rotWithShape="1">
-          <a:blip r:embed="rId2">
+          <a:blip r:embed="rId3">
             <a:duotone>
               <a:schemeClr val="bg2">
                 <a:shade val="45000"/>
@@ -24223,7 +24911,7 @@
         </p:xfrm>
         <a:graphic>
           <a:graphicData uri="http://schemas.openxmlformats.org/drawingml/2006/diagram">
-            <dgm:relIds xmlns:dgm="http://schemas.openxmlformats.org/drawingml/2006/diagram" xmlns:r="http://schemas.openxmlformats.org/officeDocument/2006/relationships" r:dm="rId3" r:lo="rId4" r:qs="rId5" r:cs="rId6"/>
+            <dgm:relIds xmlns:dgm="http://schemas.openxmlformats.org/drawingml/2006/diagram" xmlns:r="http://schemas.openxmlformats.org/officeDocument/2006/relationships" r:dm="rId4" r:lo="rId5" r:qs="rId6" r:cs="rId7"/>
           </a:graphicData>
         </a:graphic>
       </p:graphicFrame>
@@ -24340,7 +25028,7 @@
           <p:nvPr/>
         </p:nvPicPr>
         <p:blipFill rotWithShape="1">
-          <a:blip r:embed="rId2"/>
+          <a:blip r:embed="rId3"/>
           <a:srcRect t="19643"/>
           <a:stretch/>
         </p:blipFill>
@@ -24670,7 +25358,7 @@
           <p:nvPr/>
         </p:nvPicPr>
         <p:blipFill rotWithShape="1">
-          <a:blip r:embed="rId2">
+          <a:blip r:embed="rId3">
             <a:extLst>
               <a:ext uri="{28A0092B-C50C-407E-A947-70E740481C1C}">
                 <a14:useLocalDpi xmlns:a14="http://schemas.microsoft.com/office/drawing/2010/main" val="0"/>

</xml_diff>